<commit_message>
Edits to figures, proposed work
</commit_message>
<xml_diff>
--- a/ilcinocaml/docs/paper/figures/ideal-setup.pptx
+++ b/ilcinocaml/docs/paper/figures/ideal-setup.pptx
@@ -4,6 +4,9 @@
   <p:sldMasterIdLst>
     <p:sldMasterId id="2147483648" r:id="rId1"/>
   </p:sldMasterIdLst>
+  <p:notesMasterIdLst>
+    <p:notesMasterId r:id="rId3"/>
+  </p:notesMasterIdLst>
   <p:sldIdLst>
     <p:sldId id="256" r:id="rId2"/>
   </p:sldIdLst>
@@ -104,7 +107,362 @@
       </a:defRPr>
     </a:lvl9pPr>
   </p:defaultTextStyle>
+  <p:extLst>
+    <p:ext uri="{EFAFB233-063F-42B5-8137-9DF3F51BA10A}">
+      <p15:sldGuideLst xmlns:p15="http://schemas.microsoft.com/office/powerpoint/2012/main"/>
+    </p:ext>
+  </p:extLst>
 </p:presentation>
+</file>
+
+<file path=ppt/notesMasters/notesMaster1.xml><?xml version="1.0" encoding="utf-8"?>
+<p:notesMaster xmlns:a="http://schemas.openxmlformats.org/drawingml/2006/main" xmlns:r="http://schemas.openxmlformats.org/officeDocument/2006/relationships" xmlns:p="http://schemas.openxmlformats.org/presentationml/2006/main">
+  <p:cSld>
+    <p:bg>
+      <p:bgRef idx="1001">
+        <a:schemeClr val="bg1"/>
+      </p:bgRef>
+    </p:bg>
+    <p:spTree>
+      <p:nvGrpSpPr>
+        <p:cNvPr id="1" name=""/>
+        <p:cNvGrpSpPr/>
+        <p:nvPr/>
+      </p:nvGrpSpPr>
+      <p:grpSpPr>
+        <a:xfrm>
+          <a:off x="0" y="0"/>
+          <a:ext cx="0" cy="0"/>
+          <a:chOff x="0" y="0"/>
+          <a:chExt cx="0" cy="0"/>
+        </a:xfrm>
+      </p:grpSpPr>
+      <p:sp>
+        <p:nvSpPr>
+          <p:cNvPr id="2" name="Header Placeholder 1"/>
+          <p:cNvSpPr>
+            <a:spLocks noGrp="1"/>
+          </p:cNvSpPr>
+          <p:nvPr>
+            <p:ph type="hdr" sz="quarter"/>
+          </p:nvPr>
+        </p:nvSpPr>
+        <p:spPr>
+          <a:xfrm>
+            <a:off x="0" y="0"/>
+            <a:ext cx="2971800" cy="458788"/>
+          </a:xfrm>
+          <a:prstGeom prst="rect">
+            <a:avLst/>
+          </a:prstGeom>
+        </p:spPr>
+        <p:txBody>
+          <a:bodyPr vert="horz" lIns="91440" tIns="45720" rIns="91440" bIns="45720" rtlCol="0"/>
+          <a:lstStyle>
+            <a:lvl1pPr algn="l">
+              <a:defRPr sz="1200"/>
+            </a:lvl1pPr>
+          </a:lstStyle>
+          <a:p>
+            <a:endParaRPr lang="en-US"/>
+          </a:p>
+        </p:txBody>
+      </p:sp>
+      <p:sp>
+        <p:nvSpPr>
+          <p:cNvPr id="3" name="Date Placeholder 2"/>
+          <p:cNvSpPr>
+            <a:spLocks noGrp="1"/>
+          </p:cNvSpPr>
+          <p:nvPr>
+            <p:ph type="dt" idx="1"/>
+          </p:nvPr>
+        </p:nvSpPr>
+        <p:spPr>
+          <a:xfrm>
+            <a:off x="3884613" y="0"/>
+            <a:ext cx="2971800" cy="458788"/>
+          </a:xfrm>
+          <a:prstGeom prst="rect">
+            <a:avLst/>
+          </a:prstGeom>
+        </p:spPr>
+        <p:txBody>
+          <a:bodyPr vert="horz" lIns="91440" tIns="45720" rIns="91440" bIns="45720" rtlCol="0"/>
+          <a:lstStyle>
+            <a:lvl1pPr algn="r">
+              <a:defRPr sz="1200"/>
+            </a:lvl1pPr>
+          </a:lstStyle>
+          <a:p>
+            <a:fld id="{2EEA6F30-0CB3-4940-BF8E-C464E60C54BE}" type="datetimeFigureOut">
+              <a:rPr lang="en-US" smtClean="0"/>
+              <a:t>3/26/18</a:t>
+            </a:fld>
+            <a:endParaRPr lang="en-US"/>
+          </a:p>
+        </p:txBody>
+      </p:sp>
+      <p:sp>
+        <p:nvSpPr>
+          <p:cNvPr id="4" name="Slide Image Placeholder 3"/>
+          <p:cNvSpPr>
+            <a:spLocks noGrp="1" noRot="1" noChangeAspect="1"/>
+          </p:cNvSpPr>
+          <p:nvPr>
+            <p:ph type="sldImg" idx="2"/>
+          </p:nvPr>
+        </p:nvSpPr>
+        <p:spPr>
+          <a:xfrm>
+            <a:off x="685800" y="1143000"/>
+            <a:ext cx="5486400" cy="3086100"/>
+          </a:xfrm>
+          <a:prstGeom prst="rect">
+            <a:avLst/>
+          </a:prstGeom>
+          <a:noFill/>
+          <a:ln w="12700">
+            <a:solidFill>
+              <a:prstClr val="black"/>
+            </a:solidFill>
+          </a:ln>
+        </p:spPr>
+        <p:txBody>
+          <a:bodyPr vert="horz" lIns="91440" tIns="45720" rIns="91440" bIns="45720" rtlCol="0" anchor="ctr"/>
+          <a:lstStyle/>
+          <a:p>
+            <a:endParaRPr lang="en-US"/>
+          </a:p>
+        </p:txBody>
+      </p:sp>
+      <p:sp>
+        <p:nvSpPr>
+          <p:cNvPr id="5" name="Notes Placeholder 4"/>
+          <p:cNvSpPr>
+            <a:spLocks noGrp="1"/>
+          </p:cNvSpPr>
+          <p:nvPr>
+            <p:ph type="body" sz="quarter" idx="3"/>
+          </p:nvPr>
+        </p:nvSpPr>
+        <p:spPr>
+          <a:xfrm>
+            <a:off x="685800" y="4400550"/>
+            <a:ext cx="5486400" cy="3600450"/>
+          </a:xfrm>
+          <a:prstGeom prst="rect">
+            <a:avLst/>
+          </a:prstGeom>
+        </p:spPr>
+        <p:txBody>
+          <a:bodyPr vert="horz" lIns="91440" tIns="45720" rIns="91440" bIns="45720" rtlCol="0"/>
+          <a:lstStyle/>
+          <a:p>
+            <a:pPr lvl="0"/>
+            <a:r>
+              <a:rPr lang="en-US" smtClean="0"/>
+              <a:t>Click to edit Master text styles</a:t>
+            </a:r>
+          </a:p>
+          <a:p>
+            <a:pPr lvl="1"/>
+            <a:r>
+              <a:rPr lang="en-US" smtClean="0"/>
+              <a:t>Second level</a:t>
+            </a:r>
+          </a:p>
+          <a:p>
+            <a:pPr lvl="2"/>
+            <a:r>
+              <a:rPr lang="en-US" smtClean="0"/>
+              <a:t>Third level</a:t>
+            </a:r>
+          </a:p>
+          <a:p>
+            <a:pPr lvl="3"/>
+            <a:r>
+              <a:rPr lang="en-US" smtClean="0"/>
+              <a:t>Fourth level</a:t>
+            </a:r>
+          </a:p>
+          <a:p>
+            <a:pPr lvl="4"/>
+            <a:r>
+              <a:rPr lang="en-US" smtClean="0"/>
+              <a:t>Fifth level</a:t>
+            </a:r>
+            <a:endParaRPr lang="en-US"/>
+          </a:p>
+        </p:txBody>
+      </p:sp>
+      <p:sp>
+        <p:nvSpPr>
+          <p:cNvPr id="6" name="Footer Placeholder 5"/>
+          <p:cNvSpPr>
+            <a:spLocks noGrp="1"/>
+          </p:cNvSpPr>
+          <p:nvPr>
+            <p:ph type="ftr" sz="quarter" idx="4"/>
+          </p:nvPr>
+        </p:nvSpPr>
+        <p:spPr>
+          <a:xfrm>
+            <a:off x="0" y="8685213"/>
+            <a:ext cx="2971800" cy="458787"/>
+          </a:xfrm>
+          <a:prstGeom prst="rect">
+            <a:avLst/>
+          </a:prstGeom>
+        </p:spPr>
+        <p:txBody>
+          <a:bodyPr vert="horz" lIns="91440" tIns="45720" rIns="91440" bIns="45720" rtlCol="0" anchor="b"/>
+          <a:lstStyle>
+            <a:lvl1pPr algn="l">
+              <a:defRPr sz="1200"/>
+            </a:lvl1pPr>
+          </a:lstStyle>
+          <a:p>
+            <a:endParaRPr lang="en-US"/>
+          </a:p>
+        </p:txBody>
+      </p:sp>
+      <p:sp>
+        <p:nvSpPr>
+          <p:cNvPr id="7" name="Slide Number Placeholder 6"/>
+          <p:cNvSpPr>
+            <a:spLocks noGrp="1"/>
+          </p:cNvSpPr>
+          <p:nvPr>
+            <p:ph type="sldNum" sz="quarter" idx="5"/>
+          </p:nvPr>
+        </p:nvSpPr>
+        <p:spPr>
+          <a:xfrm>
+            <a:off x="3884613" y="8685213"/>
+            <a:ext cx="2971800" cy="458787"/>
+          </a:xfrm>
+          <a:prstGeom prst="rect">
+            <a:avLst/>
+          </a:prstGeom>
+        </p:spPr>
+        <p:txBody>
+          <a:bodyPr vert="horz" lIns="91440" tIns="45720" rIns="91440" bIns="45720" rtlCol="0" anchor="b"/>
+          <a:lstStyle>
+            <a:lvl1pPr algn="r">
+              <a:defRPr sz="1200"/>
+            </a:lvl1pPr>
+          </a:lstStyle>
+          <a:p>
+            <a:fld id="{A5FA82E8-0155-5D4F-AD46-322F03868F43}" type="slidenum">
+              <a:rPr lang="en-US" smtClean="0"/>
+              <a:t>‹#›</a:t>
+            </a:fld>
+            <a:endParaRPr lang="en-US"/>
+          </a:p>
+        </p:txBody>
+      </p:sp>
+    </p:spTree>
+    <p:extLst>
+      <p:ext uri="{BB962C8B-B14F-4D97-AF65-F5344CB8AC3E}">
+        <p14:creationId xmlns:p14="http://schemas.microsoft.com/office/powerpoint/2010/main" val="395393214"/>
+      </p:ext>
+    </p:extLst>
+  </p:cSld>
+  <p:clrMap bg1="lt1" tx1="dk1" bg2="lt2" tx2="dk2" accent1="accent1" accent2="accent2" accent3="accent3" accent4="accent4" accent5="accent5" accent6="accent6" hlink="hlink" folHlink="folHlink"/>
+  <p:notesStyle>
+    <a:lvl1pPr marL="0" algn="l" defTabSz="914400" rtl="0" eaLnBrk="1" latinLnBrk="0" hangingPunct="1">
+      <a:defRPr sz="1200" kern="1200">
+        <a:solidFill>
+          <a:schemeClr val="tx1"/>
+        </a:solidFill>
+        <a:latin typeface="+mn-lt"/>
+        <a:ea typeface="+mn-ea"/>
+        <a:cs typeface="+mn-cs"/>
+      </a:defRPr>
+    </a:lvl1pPr>
+    <a:lvl2pPr marL="457200" algn="l" defTabSz="914400" rtl="0" eaLnBrk="1" latinLnBrk="0" hangingPunct="1">
+      <a:defRPr sz="1200" kern="1200">
+        <a:solidFill>
+          <a:schemeClr val="tx1"/>
+        </a:solidFill>
+        <a:latin typeface="+mn-lt"/>
+        <a:ea typeface="+mn-ea"/>
+        <a:cs typeface="+mn-cs"/>
+      </a:defRPr>
+    </a:lvl2pPr>
+    <a:lvl3pPr marL="914400" algn="l" defTabSz="914400" rtl="0" eaLnBrk="1" latinLnBrk="0" hangingPunct="1">
+      <a:defRPr sz="1200" kern="1200">
+        <a:solidFill>
+          <a:schemeClr val="tx1"/>
+        </a:solidFill>
+        <a:latin typeface="+mn-lt"/>
+        <a:ea typeface="+mn-ea"/>
+        <a:cs typeface="+mn-cs"/>
+      </a:defRPr>
+    </a:lvl3pPr>
+    <a:lvl4pPr marL="1371600" algn="l" defTabSz="914400" rtl="0" eaLnBrk="1" latinLnBrk="0" hangingPunct="1">
+      <a:defRPr sz="1200" kern="1200">
+        <a:solidFill>
+          <a:schemeClr val="tx1"/>
+        </a:solidFill>
+        <a:latin typeface="+mn-lt"/>
+        <a:ea typeface="+mn-ea"/>
+        <a:cs typeface="+mn-cs"/>
+      </a:defRPr>
+    </a:lvl4pPr>
+    <a:lvl5pPr marL="1828800" algn="l" defTabSz="914400" rtl="0" eaLnBrk="1" latinLnBrk="0" hangingPunct="1">
+      <a:defRPr sz="1200" kern="1200">
+        <a:solidFill>
+          <a:schemeClr val="tx1"/>
+        </a:solidFill>
+        <a:latin typeface="+mn-lt"/>
+        <a:ea typeface="+mn-ea"/>
+        <a:cs typeface="+mn-cs"/>
+      </a:defRPr>
+    </a:lvl5pPr>
+    <a:lvl6pPr marL="2286000" algn="l" defTabSz="914400" rtl="0" eaLnBrk="1" latinLnBrk="0" hangingPunct="1">
+      <a:defRPr sz="1200" kern="1200">
+        <a:solidFill>
+          <a:schemeClr val="tx1"/>
+        </a:solidFill>
+        <a:latin typeface="+mn-lt"/>
+        <a:ea typeface="+mn-ea"/>
+        <a:cs typeface="+mn-cs"/>
+      </a:defRPr>
+    </a:lvl6pPr>
+    <a:lvl7pPr marL="2743200" algn="l" defTabSz="914400" rtl="0" eaLnBrk="1" latinLnBrk="0" hangingPunct="1">
+      <a:defRPr sz="1200" kern="1200">
+        <a:solidFill>
+          <a:schemeClr val="tx1"/>
+        </a:solidFill>
+        <a:latin typeface="+mn-lt"/>
+        <a:ea typeface="+mn-ea"/>
+        <a:cs typeface="+mn-cs"/>
+      </a:defRPr>
+    </a:lvl7pPr>
+    <a:lvl8pPr marL="3200400" algn="l" defTabSz="914400" rtl="0" eaLnBrk="1" latinLnBrk="0" hangingPunct="1">
+      <a:defRPr sz="1200" kern="1200">
+        <a:solidFill>
+          <a:schemeClr val="tx1"/>
+        </a:solidFill>
+        <a:latin typeface="+mn-lt"/>
+        <a:ea typeface="+mn-ea"/>
+        <a:cs typeface="+mn-cs"/>
+      </a:defRPr>
+    </a:lvl8pPr>
+    <a:lvl9pPr marL="3657600" algn="l" defTabSz="914400" rtl="0" eaLnBrk="1" latinLnBrk="0" hangingPunct="1">
+      <a:defRPr sz="1200" kern="1200">
+        <a:solidFill>
+          <a:schemeClr val="tx1"/>
+        </a:solidFill>
+        <a:latin typeface="+mn-lt"/>
+        <a:ea typeface="+mn-ea"/>
+        <a:cs typeface="+mn-cs"/>
+      </a:defRPr>
+    </a:lvl9pPr>
+  </p:notesStyle>
+</p:notesMaster>
 </file>
 
 <file path=ppt/slideLayouts/slideLayout1.xml><?xml version="1.0" encoding="utf-8"?>
@@ -2964,185 +3322,15 @@
           <a:chExt cx="0" cy="0"/>
         </a:xfrm>
       </p:grpSpPr>
-      <p:grpSp>
-        <p:nvGrpSpPr>
-          <p:cNvPr id="16" name="Group 15"/>
-          <p:cNvGrpSpPr/>
-          <p:nvPr/>
-        </p:nvGrpSpPr>
-        <p:grpSpPr>
-          <a:xfrm>
-            <a:off x="3383638" y="740224"/>
-            <a:ext cx="1099457" cy="1099457"/>
-            <a:chOff x="3222170" y="1077684"/>
-            <a:chExt cx="1099457" cy="1099457"/>
-          </a:xfrm>
-        </p:grpSpPr>
-        <p:sp>
-          <p:nvSpPr>
-            <p:cNvPr id="4" name="Rectangle 3"/>
-            <p:cNvSpPr/>
-            <p:nvPr/>
-          </p:nvSpPr>
-          <p:spPr>
-            <a:xfrm>
-              <a:off x="3222170" y="1077684"/>
-              <a:ext cx="1099457" cy="1099457"/>
-            </a:xfrm>
-            <a:prstGeom prst="rect">
-              <a:avLst/>
-            </a:prstGeom>
-            <a:noFill/>
-            <a:ln w="19050">
-              <a:solidFill>
-                <a:schemeClr val="tx1"/>
-              </a:solidFill>
-            </a:ln>
-          </p:spPr>
-          <p:style>
-            <a:lnRef idx="2">
-              <a:schemeClr val="accent1">
-                <a:shade val="50000"/>
-              </a:schemeClr>
-            </a:lnRef>
-            <a:fillRef idx="1">
-              <a:schemeClr val="accent1"/>
-            </a:fillRef>
-            <a:effectRef idx="0">
-              <a:schemeClr val="accent1"/>
-            </a:effectRef>
-            <a:fontRef idx="minor">
-              <a:schemeClr val="lt1"/>
-            </a:fontRef>
-          </p:style>
-          <p:txBody>
-            <a:bodyPr rtlCol="0" anchor="ctr"/>
-            <a:lstStyle/>
-            <a:p>
-              <a:pPr algn="ctr"/>
-              <a:endParaRPr lang="en-US"/>
-            </a:p>
-          </p:txBody>
-        </p:sp>
-        <p:pic>
-          <p:nvPicPr>
-            <p:cNvPr id="7" name="Picture 6"/>
-            <p:cNvPicPr>
-              <a:picLocks noChangeAspect="1"/>
-            </p:cNvPicPr>
-            <p:nvPr/>
-          </p:nvPicPr>
-          <p:blipFill>
-            <a:blip r:embed="rId2"/>
-            <a:stretch>
-              <a:fillRect/>
-            </a:stretch>
-          </p:blipFill>
-          <p:spPr>
-            <a:xfrm>
-              <a:off x="3441698" y="1322612"/>
-              <a:ext cx="660400" cy="609600"/>
-            </a:xfrm>
-            <a:prstGeom prst="rect">
-              <a:avLst/>
-            </a:prstGeom>
-          </p:spPr>
-        </p:pic>
-      </p:grpSp>
-      <p:grpSp>
-        <p:nvGrpSpPr>
-          <p:cNvPr id="17" name="Group 16"/>
-          <p:cNvGrpSpPr/>
-          <p:nvPr/>
-        </p:nvGrpSpPr>
-        <p:grpSpPr>
-          <a:xfrm>
-            <a:off x="1624689" y="2514596"/>
-            <a:ext cx="1099457" cy="1099457"/>
-            <a:chOff x="5910942" y="2710541"/>
-            <a:chExt cx="1099457" cy="1099457"/>
-          </a:xfrm>
-        </p:grpSpPr>
-        <p:sp>
-          <p:nvSpPr>
-            <p:cNvPr id="8" name="Rectangle 7"/>
-            <p:cNvSpPr/>
-            <p:nvPr/>
-          </p:nvSpPr>
-          <p:spPr>
-            <a:xfrm>
-              <a:off x="5910942" y="2710541"/>
-              <a:ext cx="1099457" cy="1099457"/>
-            </a:xfrm>
-            <a:prstGeom prst="rect">
-              <a:avLst/>
-            </a:prstGeom>
-            <a:noFill/>
-            <a:ln w="19050">
-              <a:solidFill>
-                <a:schemeClr val="tx1"/>
-              </a:solidFill>
-            </a:ln>
-          </p:spPr>
-          <p:style>
-            <a:lnRef idx="2">
-              <a:schemeClr val="accent1">
-                <a:shade val="50000"/>
-              </a:schemeClr>
-            </a:lnRef>
-            <a:fillRef idx="1">
-              <a:schemeClr val="accent1"/>
-            </a:fillRef>
-            <a:effectRef idx="0">
-              <a:schemeClr val="accent1"/>
-            </a:effectRef>
-            <a:fontRef idx="minor">
-              <a:schemeClr val="lt1"/>
-            </a:fontRef>
-          </p:style>
-          <p:txBody>
-            <a:bodyPr rtlCol="0" anchor="ctr"/>
-            <a:lstStyle/>
-            <a:p>
-              <a:pPr algn="ctr"/>
-              <a:endParaRPr lang="en-US"/>
-            </a:p>
-          </p:txBody>
-        </p:sp>
-        <p:pic>
-          <p:nvPicPr>
-            <p:cNvPr id="9" name="Picture 8"/>
-            <p:cNvPicPr>
-              <a:picLocks noChangeAspect="1"/>
-            </p:cNvPicPr>
-            <p:nvPr/>
-          </p:nvPicPr>
-          <p:blipFill>
-            <a:blip r:embed="rId3"/>
-            <a:stretch>
-              <a:fillRect/>
-            </a:stretch>
-          </p:blipFill>
-          <p:spPr>
-            <a:xfrm>
-              <a:off x="6111420" y="2911019"/>
-              <a:ext cx="698500" cy="698500"/>
-            </a:xfrm>
-            <a:prstGeom prst="rect">
-              <a:avLst/>
-            </a:prstGeom>
-          </p:spPr>
-        </p:pic>
-      </p:grpSp>
-      <p:sp>
-        <p:nvSpPr>
-          <p:cNvPr id="10" name="Rectangle 9"/>
+      <p:sp>
+        <p:nvSpPr>
+          <p:cNvPr id="4" name="Rectangle 3"/>
           <p:cNvSpPr/>
           <p:nvPr/>
         </p:nvSpPr>
         <p:spPr>
           <a:xfrm>
-            <a:off x="5136239" y="2514596"/>
+            <a:off x="3395995" y="1110931"/>
             <a:ext cx="1099457" cy="1099457"/>
           </a:xfrm>
           <a:prstGeom prst="rect">
@@ -3182,13 +3370,13 @@
       </p:sp>
       <p:sp>
         <p:nvSpPr>
-          <p:cNvPr id="12" name="Rectangle 11"/>
+          <p:cNvPr id="8" name="Rectangle 7"/>
           <p:cNvSpPr/>
           <p:nvPr/>
         </p:nvSpPr>
         <p:spPr>
           <a:xfrm>
-            <a:off x="6888840" y="2514596"/>
+            <a:off x="1637046" y="2885303"/>
             <a:ext cx="1099457" cy="1099457"/>
           </a:xfrm>
           <a:prstGeom prst="rect">
@@ -3228,13 +3416,13 @@
       </p:sp>
       <p:sp>
         <p:nvSpPr>
-          <p:cNvPr id="14" name="Rectangle 13"/>
+          <p:cNvPr id="10" name="Rectangle 9"/>
           <p:cNvSpPr/>
           <p:nvPr/>
         </p:nvSpPr>
         <p:spPr>
           <a:xfrm>
-            <a:off x="9505025" y="2514596"/>
+            <a:off x="5148596" y="2885303"/>
             <a:ext cx="1099457" cy="1099457"/>
           </a:xfrm>
           <a:prstGeom prst="rect">
@@ -3272,30 +3460,98 @@
           </a:p>
         </p:txBody>
       </p:sp>
-      <p:pic>
-        <p:nvPicPr>
-          <p:cNvPr id="21" name="Picture 20"/>
-          <p:cNvPicPr>
-            <a:picLocks noChangeAspect="1"/>
-          </p:cNvPicPr>
+      <p:sp>
+        <p:nvSpPr>
+          <p:cNvPr id="12" name="Rectangle 11"/>
+          <p:cNvSpPr/>
           <p:nvPr/>
-        </p:nvPicPr>
-        <p:blipFill>
-          <a:blip r:embed="rId4"/>
-          <a:stretch>
-            <a:fillRect/>
-          </a:stretch>
-        </p:blipFill>
+        </p:nvSpPr>
         <p:spPr>
           <a:xfrm>
-            <a:off x="8302161" y="3013524"/>
-            <a:ext cx="889000" cy="101600"/>
+            <a:off x="6901197" y="2885303"/>
+            <a:ext cx="1099457" cy="1099457"/>
           </a:xfrm>
           <a:prstGeom prst="rect">
             <a:avLst/>
           </a:prstGeom>
-        </p:spPr>
-      </p:pic>
+          <a:noFill/>
+          <a:ln w="19050">
+            <a:solidFill>
+              <a:schemeClr val="tx1"/>
+            </a:solidFill>
+          </a:ln>
+        </p:spPr>
+        <p:style>
+          <a:lnRef idx="2">
+            <a:schemeClr val="accent1">
+              <a:shade val="50000"/>
+            </a:schemeClr>
+          </a:lnRef>
+          <a:fillRef idx="1">
+            <a:schemeClr val="accent1"/>
+          </a:fillRef>
+          <a:effectRef idx="0">
+            <a:schemeClr val="accent1"/>
+          </a:effectRef>
+          <a:fontRef idx="minor">
+            <a:schemeClr val="lt1"/>
+          </a:fontRef>
+        </p:style>
+        <p:txBody>
+          <a:bodyPr rtlCol="0" anchor="ctr"/>
+          <a:lstStyle/>
+          <a:p>
+            <a:pPr algn="ctr"/>
+            <a:endParaRPr lang="en-US"/>
+          </a:p>
+        </p:txBody>
+      </p:sp>
+      <p:sp>
+        <p:nvSpPr>
+          <p:cNvPr id="14" name="Rectangle 13"/>
+          <p:cNvSpPr/>
+          <p:nvPr/>
+        </p:nvSpPr>
+        <p:spPr>
+          <a:xfrm>
+            <a:off x="9517382" y="2885303"/>
+            <a:ext cx="1099457" cy="1099457"/>
+          </a:xfrm>
+          <a:prstGeom prst="rect">
+            <a:avLst/>
+          </a:prstGeom>
+          <a:noFill/>
+          <a:ln w="19050">
+            <a:solidFill>
+              <a:schemeClr val="tx1"/>
+            </a:solidFill>
+          </a:ln>
+        </p:spPr>
+        <p:style>
+          <a:lnRef idx="2">
+            <a:schemeClr val="accent1">
+              <a:shade val="50000"/>
+            </a:schemeClr>
+          </a:lnRef>
+          <a:fillRef idx="1">
+            <a:schemeClr val="accent1"/>
+          </a:fillRef>
+          <a:effectRef idx="0">
+            <a:schemeClr val="accent1"/>
+          </a:effectRef>
+          <a:fontRef idx="minor">
+            <a:schemeClr val="lt1"/>
+          </a:fontRef>
+        </p:style>
+        <p:txBody>
+          <a:bodyPr rtlCol="0" anchor="ctr"/>
+          <a:lstStyle/>
+          <a:p>
+            <a:pPr algn="ctr"/>
+            <a:endParaRPr lang="en-US"/>
+          </a:p>
+        </p:txBody>
+      </p:sp>
       <p:cxnSp>
         <p:nvCxnSpPr>
           <p:cNvPr id="24" name="Elbow Connector 23"/>
@@ -3307,7 +3563,7 @@
         </p:nvCxnSpPr>
         <p:spPr>
           <a:xfrm rot="10800000" flipV="1">
-            <a:off x="2174418" y="1289952"/>
+            <a:off x="2186775" y="1660659"/>
             <a:ext cx="1209220" cy="1224643"/>
           </a:xfrm>
           <a:prstGeom prst="bentConnector2">
@@ -3341,7 +3597,7 @@
         </p:nvCxnSpPr>
         <p:spPr>
           <a:xfrm>
-            <a:off x="4483095" y="1289953"/>
+            <a:off x="4495452" y="1660660"/>
             <a:ext cx="2955474" cy="1224643"/>
           </a:xfrm>
           <a:prstGeom prst="bentConnector2">
@@ -3372,7 +3628,7 @@
         </p:nvCxnSpPr>
         <p:spPr>
           <a:xfrm>
-            <a:off x="4483094" y="1459987"/>
+            <a:off x="4495451" y="1830694"/>
             <a:ext cx="1202873" cy="1042416"/>
           </a:xfrm>
           <a:prstGeom prst="bentConnector2">
@@ -3403,7 +3659,7 @@
         </p:nvCxnSpPr>
         <p:spPr>
           <a:xfrm>
-            <a:off x="4479447" y="1106419"/>
+            <a:off x="4491804" y="1477126"/>
             <a:ext cx="5571659" cy="1408176"/>
           </a:xfrm>
           <a:prstGeom prst="bentConnector2">
@@ -3434,7 +3690,7 @@
         </p:nvCxnSpPr>
         <p:spPr>
           <a:xfrm rot="10800000">
-            <a:off x="2174417" y="3614052"/>
+            <a:off x="2186774" y="3984759"/>
             <a:ext cx="1209220" cy="1224643"/>
           </a:xfrm>
           <a:prstGeom prst="bentConnector2">
@@ -3467,7 +3723,7 @@
         </p:nvCxnSpPr>
         <p:spPr>
           <a:xfrm flipV="1">
-            <a:off x="3377290" y="3614053"/>
+            <a:off x="3389647" y="3984760"/>
             <a:ext cx="4061279" cy="1224644"/>
           </a:xfrm>
           <a:prstGeom prst="bentConnector2">
@@ -3500,7 +3756,7 @@
         </p:nvCxnSpPr>
         <p:spPr>
           <a:xfrm flipV="1">
-            <a:off x="3589561" y="3614053"/>
+            <a:off x="3601918" y="3984760"/>
             <a:ext cx="2096407" cy="1042413"/>
           </a:xfrm>
           <a:prstGeom prst="bentConnector2">
@@ -3531,7 +3787,7 @@
         </p:nvCxnSpPr>
         <p:spPr>
           <a:xfrm flipV="1">
-            <a:off x="3439994" y="3614052"/>
+            <a:off x="3452351" y="3984759"/>
             <a:ext cx="6611112" cy="1408173"/>
           </a:xfrm>
           <a:prstGeom prst="bentConnector2">
@@ -3562,7 +3818,7 @@
         </p:nvSpPr>
         <p:spPr>
           <a:xfrm>
-            <a:off x="3383637" y="4277134"/>
+            <a:off x="3395994" y="4647841"/>
             <a:ext cx="1099457" cy="1099457"/>
           </a:xfrm>
           <a:prstGeom prst="rect">
@@ -3604,7 +3860,79 @@
       </p:sp>
       <p:pic>
         <p:nvPicPr>
-          <p:cNvPr id="50" name="Picture 49"/>
+          <p:cNvPr id="2" name="Picture 1"/>
+          <p:cNvPicPr>
+            <a:picLocks noChangeAspect="1"/>
+          </p:cNvPicPr>
+          <p:nvPr/>
+        </p:nvPicPr>
+        <p:blipFill>
+          <a:blip r:embed="rId2"/>
+          <a:stretch>
+            <a:fillRect/>
+          </a:stretch>
+        </p:blipFill>
+        <p:spPr>
+          <a:xfrm>
+            <a:off x="3652678" y="1393959"/>
+            <a:ext cx="571500" cy="533400"/>
+          </a:xfrm>
+          <a:prstGeom prst="rect">
+            <a:avLst/>
+          </a:prstGeom>
+        </p:spPr>
+      </p:pic>
+      <p:pic>
+        <p:nvPicPr>
+          <p:cNvPr id="3" name="Picture 2"/>
+          <p:cNvPicPr>
+            <a:picLocks noChangeAspect="1"/>
+          </p:cNvPicPr>
+          <p:nvPr/>
+        </p:nvPicPr>
+        <p:blipFill>
+          <a:blip r:embed="rId3"/>
+          <a:stretch>
+            <a:fillRect/>
+          </a:stretch>
+        </p:blipFill>
+        <p:spPr>
+          <a:xfrm>
+            <a:off x="3627278" y="4918169"/>
+            <a:ext cx="622300" cy="558800"/>
+          </a:xfrm>
+          <a:prstGeom prst="rect">
+            <a:avLst/>
+          </a:prstGeom>
+        </p:spPr>
+      </p:pic>
+      <p:pic>
+        <p:nvPicPr>
+          <p:cNvPr id="6" name="Picture 5"/>
+          <p:cNvPicPr>
+            <a:picLocks noChangeAspect="1"/>
+          </p:cNvPicPr>
+          <p:nvPr/>
+        </p:nvPicPr>
+        <p:blipFill>
+          <a:blip r:embed="rId4"/>
+          <a:stretch>
+            <a:fillRect/>
+          </a:stretch>
+        </p:blipFill>
+        <p:spPr>
+          <a:xfrm>
+            <a:off x="5361774" y="3079685"/>
+            <a:ext cx="673100" cy="698500"/>
+          </a:xfrm>
+          <a:prstGeom prst="rect">
+            <a:avLst/>
+          </a:prstGeom>
+        </p:spPr>
+      </p:pic>
+      <p:pic>
+        <p:nvPicPr>
+          <p:cNvPr id="11" name="Picture 10"/>
           <p:cNvPicPr>
             <a:picLocks noChangeAspect="1"/>
           </p:cNvPicPr>
@@ -3618,8 +3946,8 @@
         </p:blipFill>
         <p:spPr>
           <a:xfrm>
-            <a:off x="3561573" y="4503012"/>
-            <a:ext cx="736600" cy="647700"/>
+            <a:off x="7107937" y="3091877"/>
+            <a:ext cx="698500" cy="698500"/>
           </a:xfrm>
           <a:prstGeom prst="rect">
             <a:avLst/>
@@ -3628,7 +3956,7 @@
       </p:pic>
       <p:pic>
         <p:nvPicPr>
-          <p:cNvPr id="51" name="Picture 50"/>
+          <p:cNvPr id="13" name="Picture 12"/>
           <p:cNvPicPr>
             <a:picLocks noChangeAspect="1"/>
           </p:cNvPicPr>
@@ -3642,8 +3970,8 @@
         </p:blipFill>
         <p:spPr>
           <a:xfrm>
-            <a:off x="5292267" y="2651828"/>
-            <a:ext cx="787400" cy="812800"/>
+            <a:off x="9676113" y="3085465"/>
+            <a:ext cx="774700" cy="698500"/>
           </a:xfrm>
           <a:prstGeom prst="rect">
             <a:avLst/>
@@ -3652,7 +3980,7 @@
       </p:pic>
       <p:pic>
         <p:nvPicPr>
-          <p:cNvPr id="52" name="Picture 51"/>
+          <p:cNvPr id="15" name="Picture 14"/>
           <p:cNvPicPr>
             <a:picLocks noChangeAspect="1"/>
           </p:cNvPicPr>
@@ -3666,8 +3994,8 @@
         </p:blipFill>
         <p:spPr>
           <a:xfrm>
-            <a:off x="7026723" y="2664020"/>
-            <a:ext cx="812800" cy="812800"/>
+            <a:off x="8371668" y="3378135"/>
+            <a:ext cx="774700" cy="101600"/>
           </a:xfrm>
           <a:prstGeom prst="rect">
             <a:avLst/>
@@ -3676,7 +4004,7 @@
       </p:pic>
       <p:pic>
         <p:nvPicPr>
-          <p:cNvPr id="53" name="Picture 52"/>
+          <p:cNvPr id="7" name="Picture 6"/>
           <p:cNvPicPr>
             <a:picLocks noChangeAspect="1"/>
           </p:cNvPicPr>
@@ -3690,8 +4018,8 @@
         </p:blipFill>
         <p:spPr>
           <a:xfrm>
-            <a:off x="9593906" y="2651828"/>
-            <a:ext cx="914400" cy="812800"/>
+            <a:off x="1945473" y="3143185"/>
+            <a:ext cx="482600" cy="571500"/>
           </a:xfrm>
           <a:prstGeom prst="rect">
             <a:avLst/>
@@ -3970,4 +4298,265 @@
     </a:ext>
   </a:extLst>
 </a:theme>
+</file>
+
+<file path=ppt/theme/theme2.xml><?xml version="1.0" encoding="utf-8"?>
+<a:theme xmlns:a="http://schemas.openxmlformats.org/drawingml/2006/main" name="Office Theme">
+  <a:themeElements>
+    <a:clrScheme name="Office">
+      <a:dk1>
+        <a:sysClr val="windowText" lastClr="000000"/>
+      </a:dk1>
+      <a:lt1>
+        <a:sysClr val="window" lastClr="FFFFFF"/>
+      </a:lt1>
+      <a:dk2>
+        <a:srgbClr val="44546A"/>
+      </a:dk2>
+      <a:lt2>
+        <a:srgbClr val="E7E6E6"/>
+      </a:lt2>
+      <a:accent1>
+        <a:srgbClr val="4472C4"/>
+      </a:accent1>
+      <a:accent2>
+        <a:srgbClr val="ED7D31"/>
+      </a:accent2>
+      <a:accent3>
+        <a:srgbClr val="A5A5A5"/>
+      </a:accent3>
+      <a:accent4>
+        <a:srgbClr val="FFC000"/>
+      </a:accent4>
+      <a:accent5>
+        <a:srgbClr val="5B9BD5"/>
+      </a:accent5>
+      <a:accent6>
+        <a:srgbClr val="70AD47"/>
+      </a:accent6>
+      <a:hlink>
+        <a:srgbClr val="0563C1"/>
+      </a:hlink>
+      <a:folHlink>
+        <a:srgbClr val="954F72"/>
+      </a:folHlink>
+    </a:clrScheme>
+    <a:fontScheme name="Office">
+      <a:majorFont>
+        <a:latin typeface="Calibri Light" panose="020F0302020204030204"/>
+        <a:ea typeface=""/>
+        <a:cs typeface=""/>
+        <a:font script="Jpan" typeface="Yu Gothic Light"/>
+        <a:font script="Hang" typeface="맑은 고딕"/>
+        <a:font script="Hans" typeface="DengXian Light"/>
+        <a:font script="Hant" typeface="新細明體"/>
+        <a:font script="Arab" typeface="Times New Roman"/>
+        <a:font script="Hebr" typeface="Times New Roman"/>
+        <a:font script="Thai" typeface="Angsana New"/>
+        <a:font script="Ethi" typeface="Nyala"/>
+        <a:font script="Beng" typeface="Vrinda"/>
+        <a:font script="Gujr" typeface="Shruti"/>
+        <a:font script="Khmr" typeface="MoolBoran"/>
+        <a:font script="Knda" typeface="Tunga"/>
+        <a:font script="Guru" typeface="Raavi"/>
+        <a:font script="Cans" typeface="Euphemia"/>
+        <a:font script="Cher" typeface="Plantagenet Cherokee"/>
+        <a:font script="Yiii" typeface="Microsoft Yi Baiti"/>
+        <a:font script="Tibt" typeface="Microsoft Himalaya"/>
+        <a:font script="Thaa" typeface="MV Boli"/>
+        <a:font script="Deva" typeface="Mangal"/>
+        <a:font script="Telu" typeface="Gautami"/>
+        <a:font script="Taml" typeface="Latha"/>
+        <a:font script="Syrc" typeface="Estrangelo Edessa"/>
+        <a:font script="Orya" typeface="Kalinga"/>
+        <a:font script="Mlym" typeface="Kartika"/>
+        <a:font script="Laoo" typeface="DokChampa"/>
+        <a:font script="Sinh" typeface="Iskoola Pota"/>
+        <a:font script="Mong" typeface="Mongolian Baiti"/>
+        <a:font script="Viet" typeface="Times New Roman"/>
+        <a:font script="Uigh" typeface="Microsoft Uighur"/>
+        <a:font script="Geor" typeface="Sylfaen"/>
+      </a:majorFont>
+      <a:minorFont>
+        <a:latin typeface="Calibri" panose="020F0502020204030204"/>
+        <a:ea typeface=""/>
+        <a:cs typeface=""/>
+        <a:font script="Jpan" typeface="Yu Gothic"/>
+        <a:font script="Hang" typeface="맑은 고딕"/>
+        <a:font script="Hans" typeface="DengXian"/>
+        <a:font script="Hant" typeface="新細明體"/>
+        <a:font script="Arab" typeface="Arial"/>
+        <a:font script="Hebr" typeface="Arial"/>
+        <a:font script="Thai" typeface="Cordia New"/>
+        <a:font script="Ethi" typeface="Nyala"/>
+        <a:font script="Beng" typeface="Vrinda"/>
+        <a:font script="Gujr" typeface="Shruti"/>
+        <a:font script="Khmr" typeface="DaunPenh"/>
+        <a:font script="Knda" typeface="Tunga"/>
+        <a:font script="Guru" typeface="Raavi"/>
+        <a:font script="Cans" typeface="Euphemia"/>
+        <a:font script="Cher" typeface="Plantagenet Cherokee"/>
+        <a:font script="Yiii" typeface="Microsoft Yi Baiti"/>
+        <a:font script="Tibt" typeface="Microsoft Himalaya"/>
+        <a:font script="Thaa" typeface="MV Boli"/>
+        <a:font script="Deva" typeface="Mangal"/>
+        <a:font script="Telu" typeface="Gautami"/>
+        <a:font script="Taml" typeface="Latha"/>
+        <a:font script="Syrc" typeface="Estrangelo Edessa"/>
+        <a:font script="Orya" typeface="Kalinga"/>
+        <a:font script="Mlym" typeface="Kartika"/>
+        <a:font script="Laoo" typeface="DokChampa"/>
+        <a:font script="Sinh" typeface="Iskoola Pota"/>
+        <a:font script="Mong" typeface="Mongolian Baiti"/>
+        <a:font script="Viet" typeface="Arial"/>
+        <a:font script="Uigh" typeface="Microsoft Uighur"/>
+        <a:font script="Geor" typeface="Sylfaen"/>
+      </a:minorFont>
+    </a:fontScheme>
+    <a:fmtScheme name="Office">
+      <a:fillStyleLst>
+        <a:solidFill>
+          <a:schemeClr val="phClr"/>
+        </a:solidFill>
+        <a:gradFill rotWithShape="1">
+          <a:gsLst>
+            <a:gs pos="0">
+              <a:schemeClr val="phClr">
+                <a:lumMod val="110000"/>
+                <a:satMod val="105000"/>
+                <a:tint val="67000"/>
+              </a:schemeClr>
+            </a:gs>
+            <a:gs pos="50000">
+              <a:schemeClr val="phClr">
+                <a:lumMod val="105000"/>
+                <a:satMod val="103000"/>
+                <a:tint val="73000"/>
+              </a:schemeClr>
+            </a:gs>
+            <a:gs pos="100000">
+              <a:schemeClr val="phClr">
+                <a:lumMod val="105000"/>
+                <a:satMod val="109000"/>
+                <a:tint val="81000"/>
+              </a:schemeClr>
+            </a:gs>
+          </a:gsLst>
+          <a:lin ang="5400000" scaled="0"/>
+        </a:gradFill>
+        <a:gradFill rotWithShape="1">
+          <a:gsLst>
+            <a:gs pos="0">
+              <a:schemeClr val="phClr">
+                <a:satMod val="103000"/>
+                <a:lumMod val="102000"/>
+                <a:tint val="94000"/>
+              </a:schemeClr>
+            </a:gs>
+            <a:gs pos="50000">
+              <a:schemeClr val="phClr">
+                <a:satMod val="110000"/>
+                <a:lumMod val="100000"/>
+                <a:shade val="100000"/>
+              </a:schemeClr>
+            </a:gs>
+            <a:gs pos="100000">
+              <a:schemeClr val="phClr">
+                <a:lumMod val="99000"/>
+                <a:satMod val="120000"/>
+                <a:shade val="78000"/>
+              </a:schemeClr>
+            </a:gs>
+          </a:gsLst>
+          <a:lin ang="5400000" scaled="0"/>
+        </a:gradFill>
+      </a:fillStyleLst>
+      <a:lnStyleLst>
+        <a:ln w="6350" cap="flat" cmpd="sng" algn="ctr">
+          <a:solidFill>
+            <a:schemeClr val="phClr"/>
+          </a:solidFill>
+          <a:prstDash val="solid"/>
+          <a:miter lim="800000"/>
+        </a:ln>
+        <a:ln w="12700" cap="flat" cmpd="sng" algn="ctr">
+          <a:solidFill>
+            <a:schemeClr val="phClr"/>
+          </a:solidFill>
+          <a:prstDash val="solid"/>
+          <a:miter lim="800000"/>
+        </a:ln>
+        <a:ln w="19050" cap="flat" cmpd="sng" algn="ctr">
+          <a:solidFill>
+            <a:schemeClr val="phClr"/>
+          </a:solidFill>
+          <a:prstDash val="solid"/>
+          <a:miter lim="800000"/>
+        </a:ln>
+      </a:lnStyleLst>
+      <a:effectStyleLst>
+        <a:effectStyle>
+          <a:effectLst/>
+        </a:effectStyle>
+        <a:effectStyle>
+          <a:effectLst/>
+        </a:effectStyle>
+        <a:effectStyle>
+          <a:effectLst>
+            <a:outerShdw blurRad="57150" dist="19050" dir="5400000" algn="ctr" rotWithShape="0">
+              <a:srgbClr val="000000">
+                <a:alpha val="63000"/>
+              </a:srgbClr>
+            </a:outerShdw>
+          </a:effectLst>
+        </a:effectStyle>
+      </a:effectStyleLst>
+      <a:bgFillStyleLst>
+        <a:solidFill>
+          <a:schemeClr val="phClr"/>
+        </a:solidFill>
+        <a:solidFill>
+          <a:schemeClr val="phClr">
+            <a:tint val="95000"/>
+            <a:satMod val="170000"/>
+          </a:schemeClr>
+        </a:solidFill>
+        <a:gradFill rotWithShape="1">
+          <a:gsLst>
+            <a:gs pos="0">
+              <a:schemeClr val="phClr">
+                <a:tint val="93000"/>
+                <a:satMod val="150000"/>
+                <a:shade val="98000"/>
+                <a:lumMod val="102000"/>
+              </a:schemeClr>
+            </a:gs>
+            <a:gs pos="50000">
+              <a:schemeClr val="phClr">
+                <a:tint val="98000"/>
+                <a:satMod val="130000"/>
+                <a:shade val="90000"/>
+                <a:lumMod val="103000"/>
+              </a:schemeClr>
+            </a:gs>
+            <a:gs pos="100000">
+              <a:schemeClr val="phClr">
+                <a:shade val="63000"/>
+                <a:satMod val="120000"/>
+              </a:schemeClr>
+            </a:gs>
+          </a:gsLst>
+          <a:lin ang="5400000" scaled="0"/>
+        </a:gradFill>
+      </a:bgFillStyleLst>
+    </a:fmtScheme>
+  </a:themeElements>
+  <a:objectDefaults/>
+  <a:extraClrSchemeLst/>
+  <a:extLst>
+    <a:ext uri="{05A4C25C-085E-4340-85A3-A5531E510DB2}">
+      <thm15:themeFamily xmlns:thm15="http://schemas.microsoft.com/office/thememl/2012/main" name="Office Theme" id="{62F939B6-93AF-4DB8-9C6B-D6C7DFDC589F}" vid="{4A3C46E8-61CC-4603-A589-7422A47A8E4A}"/>
+    </a:ext>
+  </a:extLst>
+</a:theme>
 </file>
</xml_diff>